<commit_message>
falta agregar ultimas 4 preguntas
</commit_message>
<xml_diff>
--- a/2020_enero/2020 enero.pptx
+++ b/2020_enero/2020 enero.pptx
@@ -9,6 +9,7 @@
     <p:sldId id="257" r:id="rId9"/>
     <p:sldId id="258" r:id="rId10"/>
     <p:sldId id="259" r:id="rId11"/>
+    <p:sldId id="260" r:id="rId12"/>
   </p:sldIdLst>
   <p:sldSz cx="9144000" cy="6858000" type="screen4x3"/>
   <p:notesSz cx="6858000" cy="9144000"/>
@@ -2219,7 +2220,7 @@
       </p:grpSpPr>
       <p:pic xmlns:a="http://schemas.openxmlformats.org/drawingml/2006/main" xmlns:r="http://schemas.openxmlformats.org/officeDocument/2006/relationships" xmlns:p="http://schemas.openxmlformats.org/presentationml/2006/main">
         <p:nvPicPr>
-          <p:cNvPr id="2" name="Content Placeholder 2"/>
+          <p:cNvPr id="2" name=""/>
           <p:cNvPicPr/>
           <p:nvPr/>
         </p:nvPicPr>
@@ -2231,8 +2232,8 @@
         </p:blipFill>
         <p:spPr>
           <a:xfrm>
-            <a:off x="457200" y="1600200"/>
-            <a:ext cx="8229600" cy="4525963"/>
+            <a:off x="0" y="0"/>
+            <a:ext cx="9144000" cy="6858000"/>
           </a:xfrm>
           <a:prstGeom prst="rect">
             <a:avLst/>
@@ -2342,6 +2343,75 @@
 </file>
 
 <file path=ppt/slides/slide4.xml><?xml version="1.0" encoding="utf-8"?>
+<p:sld xmlns:a="http://schemas.openxmlformats.org/drawingml/2006/main" xmlns:r="http://schemas.openxmlformats.org/officeDocument/2006/relationships" xmlns:p="http://schemas.openxmlformats.org/presentationml/2006/main">
+  <p:cSld>
+    <p:spTree>
+      <p:nvGrpSpPr>
+        <p:cNvPr id="1" name=""/>
+        <p:cNvGrpSpPr/>
+        <p:nvPr/>
+      </p:nvGrpSpPr>
+      <p:grpSpPr>
+        <a:xfrm>
+          <a:off x="0" y="0"/>
+          <a:ext cx="0" cy="0"/>
+          <a:chOff x="0" y="0"/>
+          <a:chExt cx="0" cy="0"/>
+        </a:xfrm>
+      </p:grpSpPr>
+      <p:pic xmlns:a="http://schemas.openxmlformats.org/drawingml/2006/main" xmlns:r="http://schemas.openxmlformats.org/officeDocument/2006/relationships" xmlns:p="http://schemas.openxmlformats.org/presentationml/2006/main">
+        <p:nvPicPr>
+          <p:cNvPr id="2" name="Content Placeholder 2"/>
+          <p:cNvPicPr/>
+          <p:nvPr/>
+        </p:nvPicPr>
+        <p:blipFill>
+          <a:blip cstate="print" r:embed="rId2"/>
+          <a:stretch>
+            <a:fillRect/>
+          </a:stretch>
+        </p:blipFill>
+        <p:spPr>
+          <a:xfrm>
+            <a:off x="457200" y="1600200"/>
+            <a:ext cx="4038600" cy="4525963"/>
+          </a:xfrm>
+          <a:prstGeom prst="rect">
+            <a:avLst/>
+          </a:prstGeom>
+        </p:spPr>
+      </p:pic>
+      <p:pic xmlns:a="http://schemas.openxmlformats.org/drawingml/2006/main" xmlns:r="http://schemas.openxmlformats.org/officeDocument/2006/relationships" xmlns:p="http://schemas.openxmlformats.org/presentationml/2006/main">
+        <p:nvPicPr>
+          <p:cNvPr id="3" name="Content Placeholder 3"/>
+          <p:cNvPicPr/>
+          <p:nvPr/>
+        </p:nvPicPr>
+        <p:blipFill>
+          <a:blip cstate="print" r:embed="rId3"/>
+          <a:stretch>
+            <a:fillRect/>
+          </a:stretch>
+        </p:blipFill>
+        <p:spPr>
+          <a:xfrm>
+            <a:off x="4648200" y="1600200"/>
+            <a:ext cx="4038600" cy="4525963"/>
+          </a:xfrm>
+          <a:prstGeom prst="rect">
+            <a:avLst/>
+          </a:prstGeom>
+        </p:spPr>
+      </p:pic>
+    </p:spTree>
+  </p:cSld>
+  <p:clrMapOvr>
+    <a:masterClrMapping/>
+  </p:clrMapOvr>
+</p:sld>
+</file>
+
+<file path=ppt/slides/slide5.xml><?xml version="1.0" encoding="utf-8"?>
 <p:sld xmlns:a="http://schemas.openxmlformats.org/drawingml/2006/main" xmlns:r="http://schemas.openxmlformats.org/officeDocument/2006/relationships" xmlns:p="http://schemas.openxmlformats.org/presentationml/2006/main">
   <p:cSld>
     <p:spTree>

</xml_diff>